<commit_message>
Update High School/Photography/Unit 4 - Composition and Principles of Design/Section 1 - Composiiton/Assets/Unit 4 - Section 1 - Composition.pptx
</commit_message>
<xml_diff>
--- a/High School/Photography/Unit 4 - Composition and Principles of Design/Section 1 - Composiiton/Assets/Unit 4 - Section 1 - Composition.pptx
+++ b/High School/Photography/Unit 4 - Composition and Principles of Design/Section 1 - Composiiton/Assets/Unit 4 - Section 1 - Composition.pptx
@@ -5,10 +5,10 @@
     <p:sldMasterId id="2147483669" r:id="rId1"/>
   </p:sldMasterIdLst>
   <p:notesMasterIdLst>
-    <p:notesMasterId r:id="rId10"/>
+    <p:notesMasterId r:id="rId11"/>
   </p:notesMasterIdLst>
   <p:handoutMasterIdLst>
-    <p:handoutMasterId r:id="rId11"/>
+    <p:handoutMasterId r:id="rId12"/>
   </p:handoutMasterIdLst>
   <p:sldIdLst>
     <p:sldId id="268" r:id="rId2"/>
@@ -18,7 +18,8 @@
     <p:sldId id="274" r:id="rId6"/>
     <p:sldId id="275" r:id="rId7"/>
     <p:sldId id="276" r:id="rId8"/>
-    <p:sldId id="277" r:id="rId9"/>
+    <p:sldId id="278" r:id="rId9"/>
+    <p:sldId id="277" r:id="rId10"/>
   </p:sldIdLst>
   <p:sldSz cx="12192000" cy="6858000"/>
   <p:notesSz cx="6858000" cy="9144000"/>
@@ -7901,6 +7902,160 @@
       </p:grpSpPr>
       <p:sp>
         <p:nvSpPr>
+          <p:cNvPr id="2" name="Title 1">
+            <a:extLst>
+              <a:ext uri="{FF2B5EF4-FFF2-40B4-BE49-F238E27FC236}">
+                <a16:creationId xmlns:a16="http://schemas.microsoft.com/office/drawing/2014/main" id="{44F98E19-98DC-4188-AA0E-C935515289EA}"/>
+              </a:ext>
+            </a:extLst>
+          </p:cNvPr>
+          <p:cNvSpPr>
+            <a:spLocks noGrp="1"/>
+          </p:cNvSpPr>
+          <p:nvPr>
+            <p:ph type="title"/>
+          </p:nvPr>
+        </p:nvSpPr>
+        <p:spPr/>
+        <p:txBody>
+          <a:bodyPr>
+            <a:normAutofit fontScale="90000"/>
+          </a:bodyPr>
+          <a:lstStyle/>
+          <a:p>
+            <a:r>
+              <a:rPr lang="en-US" dirty="0"/>
+              <a:t>Elements</a:t>
+            </a:r>
+            <a:br>
+              <a:rPr lang="en-US" dirty="0"/>
+            </a:br>
+            <a:r>
+              <a:rPr lang="en-US" dirty="0"/>
+              <a:t>Shape and Form</a:t>
+            </a:r>
+          </a:p>
+        </p:txBody>
+      </p:sp>
+      <p:sp>
+        <p:nvSpPr>
+          <p:cNvPr id="6" name="Content Placeholder 5">
+            <a:extLst>
+              <a:ext uri="{FF2B5EF4-FFF2-40B4-BE49-F238E27FC236}">
+                <a16:creationId xmlns:a16="http://schemas.microsoft.com/office/drawing/2014/main" id="{8EF0DF56-E8D4-415A-B124-D2E03ACA9CC8}"/>
+              </a:ext>
+            </a:extLst>
+          </p:cNvPr>
+          <p:cNvSpPr>
+            <a:spLocks noGrp="1"/>
+          </p:cNvSpPr>
+          <p:nvPr>
+            <p:ph idx="1"/>
+          </p:nvPr>
+        </p:nvSpPr>
+        <p:spPr/>
+        <p:txBody>
+          <a:bodyPr/>
+          <a:lstStyle/>
+          <a:p>
+            <a:r>
+              <a:rPr lang="en-US" dirty="0"/>
+              <a:t>Shapes can be geometric or organic</a:t>
+            </a:r>
+          </a:p>
+          <a:p>
+            <a:r>
+              <a:rPr lang="en-US" dirty="0"/>
+              <a:t>Circles, ovals, triangles, rectangles</a:t>
+            </a:r>
+          </a:p>
+          <a:p>
+            <a:r>
+              <a:rPr lang="en-US" dirty="0"/>
+              <a:t>Wheels, road signs, windows are common examples</a:t>
+            </a:r>
+          </a:p>
+          <a:p>
+            <a:r>
+              <a:rPr lang="en-US" dirty="0"/>
+              <a:t>Organic examples could be clouds, puddles, footprints</a:t>
+            </a:r>
+          </a:p>
+        </p:txBody>
+      </p:sp>
+      <p:sp>
+        <p:nvSpPr>
+          <p:cNvPr id="5" name="Footer Placeholder 4">
+            <a:extLst>
+              <a:ext uri="{FF2B5EF4-FFF2-40B4-BE49-F238E27FC236}">
+                <a16:creationId xmlns:a16="http://schemas.microsoft.com/office/drawing/2014/main" id="{89CF04B5-4109-4835-908D-122E9ED4ABE9}"/>
+              </a:ext>
+            </a:extLst>
+          </p:cNvPr>
+          <p:cNvSpPr>
+            <a:spLocks noGrp="1"/>
+          </p:cNvSpPr>
+          <p:nvPr>
+            <p:ph type="ftr" sz="quarter" idx="11"/>
+          </p:nvPr>
+        </p:nvSpPr>
+        <p:spPr/>
+        <p:txBody>
+          <a:bodyPr/>
+          <a:lstStyle/>
+          <a:p>
+            <a:r>
+              <a:rPr lang="en-US"/>
+              <a:t>Add a footer</a:t>
+            </a:r>
+            <a:endParaRPr lang="en-US" dirty="0"/>
+          </a:p>
+        </p:txBody>
+      </p:sp>
+    </p:spTree>
+    <p:extLst>
+      <p:ext uri="{BB962C8B-B14F-4D97-AF65-F5344CB8AC3E}">
+        <p14:creationId xmlns:p14="http://schemas.microsoft.com/office/powerpoint/2010/main" val="3449612659"/>
+      </p:ext>
+    </p:extLst>
+  </p:cSld>
+  <p:clrMapOvr>
+    <a:masterClrMapping/>
+  </p:clrMapOvr>
+  <mc:AlternateContent xmlns:mc="http://schemas.openxmlformats.org/markup-compatibility/2006" xmlns:p14="http://schemas.microsoft.com/office/powerpoint/2010/main">
+    <mc:Choice Requires="p14">
+      <p:transition spd="med" p14:dur="700">
+        <p:fade/>
+      </p:transition>
+    </mc:Choice>
+    <mc:Fallback xmlns="">
+      <p:transition spd="med">
+        <p:fade/>
+      </p:transition>
+    </mc:Fallback>
+  </mc:AlternateContent>
+</p:sld>
+</file>
+
+<file path=ppt/slides/slide9.xml><?xml version="1.0" encoding="utf-8"?>
+<p:sld xmlns:a="http://schemas.openxmlformats.org/drawingml/2006/main" xmlns:r="http://schemas.openxmlformats.org/officeDocument/2006/relationships" xmlns:p="http://schemas.openxmlformats.org/presentationml/2006/main">
+  <p:cSld>
+    <p:spTree>
+      <p:nvGrpSpPr>
+        <p:cNvPr id="1" name=""/>
+        <p:cNvGrpSpPr/>
+        <p:nvPr/>
+      </p:nvGrpSpPr>
+      <p:grpSpPr>
+        <a:xfrm>
+          <a:off x="0" y="0"/>
+          <a:ext cx="0" cy="0"/>
+          <a:chOff x="0" y="0"/>
+          <a:chExt cx="0" cy="0"/>
+        </a:xfrm>
+      </p:grpSpPr>
+      <p:sp>
+        <p:nvSpPr>
           <p:cNvPr id="2" name="Footer Placeholder 1">
             <a:extLst>
               <a:ext uri="{FF2B5EF4-FFF2-40B4-BE49-F238E27FC236}">
@@ -7928,6 +8083,53 @@
           </a:p>
         </p:txBody>
       </p:sp>
+      <p:pic>
+        <p:nvPicPr>
+          <p:cNvPr id="1026" name="Picture 2" descr="Image result for photography shape and form">
+            <a:extLst>
+              <a:ext uri="{FF2B5EF4-FFF2-40B4-BE49-F238E27FC236}">
+                <a16:creationId xmlns:a16="http://schemas.microsoft.com/office/drawing/2014/main" id="{1F29982F-4295-44CB-A07F-D70F0C4485FB}"/>
+              </a:ext>
+            </a:extLst>
+          </p:cNvPr>
+          <p:cNvPicPr>
+            <a:picLocks noChangeAspect="1" noChangeArrowheads="1"/>
+          </p:cNvPicPr>
+          <p:nvPr/>
+        </p:nvPicPr>
+        <p:blipFill>
+          <a:blip r:embed="rId2">
+            <a:extLst>
+              <a:ext uri="{28A0092B-C50C-407E-A947-70E740481C1C}">
+                <a14:useLocalDpi xmlns:a14="http://schemas.microsoft.com/office/drawing/2010/main" val="0"/>
+              </a:ext>
+            </a:extLst>
+          </a:blip>
+          <a:srcRect/>
+          <a:stretch>
+            <a:fillRect/>
+          </a:stretch>
+        </p:blipFill>
+        <p:spPr bwMode="auto">
+          <a:xfrm>
+            <a:off x="3352800" y="685800"/>
+            <a:ext cx="5486400" cy="5486400"/>
+          </a:xfrm>
+          <a:prstGeom prst="rect">
+            <a:avLst/>
+          </a:prstGeom>
+          <a:noFill/>
+          <a:extLst>
+            <a:ext uri="{909E8E84-426E-40DD-AFC4-6F175D3DCCD1}">
+              <a14:hiddenFill xmlns:a14="http://schemas.microsoft.com/office/drawing/2010/main">
+                <a:solidFill>
+                  <a:srgbClr val="FFFFFF"/>
+                </a:solidFill>
+              </a14:hiddenFill>
+            </a:ext>
+          </a:extLst>
+        </p:spPr>
+      </p:pic>
     </p:spTree>
     <p:extLst>
       <p:ext uri="{BB962C8B-B14F-4D97-AF65-F5344CB8AC3E}">

</xml_diff>